<commit_message>
Dev guide update (#119)
* Remove 'Better OOP Diagram' from Model section

* Update Model section AddressBook to LoanBook

* Remove Data Encryption section

* Remove Appendix A: Suggested Programming Tasks to Get Started

* Correct formatting errors in Bicycle Management section

* Add class diagram to Bicycle Management section

* Update use cases

* Rename AddressBook to LoanBook

* Rename AddressBook to LoanBook in DeleteLoanSequenceDiagram

* nits

* Change tab char to spaces at line 996
</commit_message>
<xml_diff>
--- a/docs/diagrams/DeleteLoanSequenceDiagram.pptx
+++ b/docs/diagrams/DeleteLoanSequenceDiagram.pptx
@@ -208,7 +208,7 @@
           <a:p>
             <a:fld id="{F5CC4B3F-88C1-4FFA-B1B6-F41C21DC6924}" type="datetimeFigureOut">
               <a:rPr lang="en-US" smtClean="0"/>
-              <a:t>10/17/2018</a:t>
+              <a:t>10/22/2018</a:t>
             </a:fld>
             <a:endParaRPr lang="en-US"/>
           </a:p>
@@ -654,7 +654,7 @@
           <a:p>
             <a:fld id="{78C97017-6FC3-485B-9764-EAC9E56C1D49}" type="datetimeFigureOut">
               <a:rPr lang="en-US" smtClean="0"/>
-              <a:t>10/17/2018</a:t>
+              <a:t>10/22/2018</a:t>
             </a:fld>
             <a:endParaRPr lang="en-US"/>
           </a:p>
@@ -822,7 +822,7 @@
           <a:p>
             <a:fld id="{78C97017-6FC3-485B-9764-EAC9E56C1D49}" type="datetimeFigureOut">
               <a:rPr lang="en-US" smtClean="0"/>
-              <a:t>10/17/2018</a:t>
+              <a:t>10/22/2018</a:t>
             </a:fld>
             <a:endParaRPr lang="en-US"/>
           </a:p>
@@ -1000,7 +1000,7 @@
           <a:p>
             <a:fld id="{78C97017-6FC3-485B-9764-EAC9E56C1D49}" type="datetimeFigureOut">
               <a:rPr lang="en-US" smtClean="0"/>
-              <a:t>10/17/2018</a:t>
+              <a:t>10/22/2018</a:t>
             </a:fld>
             <a:endParaRPr lang="en-US"/>
           </a:p>
@@ -1168,7 +1168,7 @@
           <a:p>
             <a:fld id="{78C97017-6FC3-485B-9764-EAC9E56C1D49}" type="datetimeFigureOut">
               <a:rPr lang="en-US" smtClean="0"/>
-              <a:t>10/17/2018</a:t>
+              <a:t>10/22/2018</a:t>
             </a:fld>
             <a:endParaRPr lang="en-US"/>
           </a:p>
@@ -1413,7 +1413,7 @@
           <a:p>
             <a:fld id="{78C97017-6FC3-485B-9764-EAC9E56C1D49}" type="datetimeFigureOut">
               <a:rPr lang="en-US" smtClean="0"/>
-              <a:t>10/17/2018</a:t>
+              <a:t>10/22/2018</a:t>
             </a:fld>
             <a:endParaRPr lang="en-US"/>
           </a:p>
@@ -1698,7 +1698,7 @@
           <a:p>
             <a:fld id="{78C97017-6FC3-485B-9764-EAC9E56C1D49}" type="datetimeFigureOut">
               <a:rPr lang="en-US" smtClean="0"/>
-              <a:t>10/17/2018</a:t>
+              <a:t>10/22/2018</a:t>
             </a:fld>
             <a:endParaRPr lang="en-US"/>
           </a:p>
@@ -2117,7 +2117,7 @@
           <a:p>
             <a:fld id="{78C97017-6FC3-485B-9764-EAC9E56C1D49}" type="datetimeFigureOut">
               <a:rPr lang="en-US" smtClean="0"/>
-              <a:t>10/17/2018</a:t>
+              <a:t>10/22/2018</a:t>
             </a:fld>
             <a:endParaRPr lang="en-US"/>
           </a:p>
@@ -2234,7 +2234,7 @@
           <a:p>
             <a:fld id="{78C97017-6FC3-485B-9764-EAC9E56C1D49}" type="datetimeFigureOut">
               <a:rPr lang="en-US" smtClean="0"/>
-              <a:t>10/17/2018</a:t>
+              <a:t>10/22/2018</a:t>
             </a:fld>
             <a:endParaRPr lang="en-US"/>
           </a:p>
@@ -2329,7 +2329,7 @@
           <a:p>
             <a:fld id="{78C97017-6FC3-485B-9764-EAC9E56C1D49}" type="datetimeFigureOut">
               <a:rPr lang="en-US" smtClean="0"/>
-              <a:t>10/17/2018</a:t>
+              <a:t>10/22/2018</a:t>
             </a:fld>
             <a:endParaRPr lang="en-US"/>
           </a:p>
@@ -2604,7 +2604,7 @@
           <a:p>
             <a:fld id="{78C97017-6FC3-485B-9764-EAC9E56C1D49}" type="datetimeFigureOut">
               <a:rPr lang="en-US" smtClean="0"/>
-              <a:t>10/17/2018</a:t>
+              <a:t>10/22/2018</a:t>
             </a:fld>
             <a:endParaRPr lang="en-US"/>
           </a:p>
@@ -2856,7 +2856,7 @@
           <a:p>
             <a:fld id="{78C97017-6FC3-485B-9764-EAC9E56C1D49}" type="datetimeFigureOut">
               <a:rPr lang="en-US" smtClean="0"/>
-              <a:t>10/17/2018</a:t>
+              <a:t>10/22/2018</a:t>
             </a:fld>
             <a:endParaRPr lang="en-US"/>
           </a:p>
@@ -3067,7 +3067,7 @@
           <a:p>
             <a:fld id="{78C97017-6FC3-485B-9764-EAC9E56C1D49}" type="datetimeFigureOut">
               <a:rPr lang="en-US" smtClean="0"/>
-              <a:t>10/17/2018</a:t>
+              <a:t>10/22/2018</a:t>
             </a:fld>
             <a:endParaRPr lang="en-US"/>
           </a:p>
@@ -3607,7 +3607,31 @@
                   <a:schemeClr val="bg1"/>
                 </a:solidFill>
               </a:rPr>
-              <a:t>versionedAddressBook:VersionedAddressBook</a:t>
+              <a:t>versionedLoanBook</a:t>
+            </a:r>
+            <a:endParaRPr lang="en-US" sz="1600" dirty="0">
+              <a:solidFill>
+                <a:schemeClr val="bg1"/>
+              </a:solidFill>
+            </a:endParaRPr>
+          </a:p>
+          <a:p>
+            <a:pPr algn="ctr"/>
+            <a:r>
+              <a:rPr lang="en-US" sz="1600" dirty="0">
+                <a:solidFill>
+                  <a:schemeClr val="bg1"/>
+                </a:solidFill>
+              </a:rPr>
+              <a:t>:</a:t>
+            </a:r>
+            <a:r>
+              <a:rPr lang="en-US" sz="1600" dirty="0" err="1">
+                <a:solidFill>
+                  <a:schemeClr val="bg1"/>
+                </a:solidFill>
+              </a:rPr>
+              <a:t>VersionedLoanBook</a:t>
             </a:r>
             <a:endParaRPr lang="en-SG" sz="1600" dirty="0">
               <a:solidFill>

</xml_diff>